<commit_message>
small improvements to PGQL intro
</commit_message>
<xml_diff>
--- a/images/example_graphs/student_network.pptx
+++ b/images/example_graphs/student_network.pptx
@@ -2992,7 +2992,7 @@
             <a:avLst/>
           </a:prstGeom>
           <a:solidFill>
-            <a:srgbClr val="41817E"/>
+            <a:srgbClr val="94AFAE"/>
           </a:solidFill>
           <a:ln w="6350">
             <a:noFill/>
@@ -3108,7 +3108,7 @@
             <a:avLst/>
           </a:prstGeom>
           <a:solidFill>
-            <a:srgbClr val="41817E"/>
+            <a:srgbClr val="94AFAE"/>
           </a:solidFill>
           <a:ln w="6350">
             <a:noFill/>
@@ -3168,7 +3168,7 @@
             <a:avLst/>
           </a:prstGeom>
           <a:solidFill>
-            <a:srgbClr val="41817E"/>
+            <a:srgbClr val="94AFAE"/>
           </a:solidFill>
           <a:ln w="6350">
             <a:noFill/>
@@ -3347,7 +3347,7 @@
           </a:prstGeom>
           <a:ln>
             <a:solidFill>
-              <a:srgbClr val="41817E"/>
+              <a:srgbClr val="94AFAE"/>
             </a:solidFill>
             <a:tailEnd type="triangle" w="med" len="sm"/>
           </a:ln>
@@ -3386,7 +3386,7 @@
           </a:prstGeom>
           <a:ln>
             <a:solidFill>
-              <a:srgbClr val="41817E"/>
+              <a:srgbClr val="94AFAE"/>
             </a:solidFill>
             <a:tailEnd type="triangle" w="med" len="sm"/>
           </a:ln>
@@ -3425,7 +3425,7 @@
           </a:prstGeom>
           <a:ln>
             <a:solidFill>
-              <a:srgbClr val="41817E"/>
+              <a:srgbClr val="94AFAE"/>
             </a:solidFill>
             <a:tailEnd type="triangle" w="med" len="sm"/>
           </a:ln>

</xml_diff>